<commit_message>
added variables and parameters in temp
</commit_message>
<xml_diff>
--- a/Pre defense/Predefense_v.1.2.pptx
+++ b/Pre defense/Predefense_v.1.2.pptx
@@ -5,7 +5,7 @@
     <p:sldMasterId id="2147483648" r:id="rId1"/>
   </p:sldMasterIdLst>
   <p:notesMasterIdLst>
-    <p:notesMasterId r:id="rId18"/>
+    <p:notesMasterId r:id="rId20"/>
   </p:notesMasterIdLst>
   <p:sldIdLst>
     <p:sldId id="256" r:id="rId2"/>
@@ -20,10 +20,12 @@
     <p:sldId id="271" r:id="rId11"/>
     <p:sldId id="272" r:id="rId12"/>
     <p:sldId id="273" r:id="rId13"/>
-    <p:sldId id="275" r:id="rId14"/>
-    <p:sldId id="278" r:id="rId15"/>
-    <p:sldId id="263" r:id="rId16"/>
-    <p:sldId id="276" r:id="rId17"/>
+    <p:sldId id="280" r:id="rId14"/>
+    <p:sldId id="275" r:id="rId15"/>
+    <p:sldId id="278" r:id="rId16"/>
+    <p:sldId id="263" r:id="rId17"/>
+    <p:sldId id="279" r:id="rId18"/>
+    <p:sldId id="276" r:id="rId19"/>
   </p:sldIdLst>
   <p:sldSz cx="12192000" cy="6858000"/>
   <p:notesSz cx="6858000" cy="9144000"/>
@@ -218,7 +220,7 @@
           <a:p>
             <a:fld id="{AD438325-3A6D-4761-AD0C-73AF0C436541}" type="datetimeFigureOut">
               <a:rPr lang="en-US" smtClean="0"/>
-              <a:t>9/29/2024</a:t>
+              <a:t>9/30/2024</a:t>
             </a:fld>
             <a:endParaRPr lang="en-US"/>
           </a:p>
@@ -932,6 +934,124 @@
     <p:extLst>
       <p:ext uri="{BB962C8B-B14F-4D97-AF65-F5344CB8AC3E}">
         <p14:creationId xmlns:p14="http://schemas.microsoft.com/office/powerpoint/2010/main" val="3002039436"/>
+      </p:ext>
+    </p:extLst>
+  </p:cSld>
+  <p:clrMapOvr>
+    <a:masterClrMapping/>
+  </p:clrMapOvr>
+</p:notes>
+</file>
+
+<file path=ppt/notesSlides/notesSlide5.xml><?xml version="1.0" encoding="utf-8"?>
+<p:notes xmlns:a="http://schemas.openxmlformats.org/drawingml/2006/main" xmlns:r="http://schemas.openxmlformats.org/officeDocument/2006/relationships" xmlns:p="http://schemas.openxmlformats.org/presentationml/2006/main">
+  <p:cSld>
+    <p:spTree>
+      <p:nvGrpSpPr>
+        <p:cNvPr id="1" name=""/>
+        <p:cNvGrpSpPr/>
+        <p:nvPr/>
+      </p:nvGrpSpPr>
+      <p:grpSpPr>
+        <a:xfrm>
+          <a:off x="0" y="0"/>
+          <a:ext cx="0" cy="0"/>
+          <a:chOff x="0" y="0"/>
+          <a:chExt cx="0" cy="0"/>
+        </a:xfrm>
+      </p:grpSpPr>
+      <p:sp>
+        <p:nvSpPr>
+          <p:cNvPr id="2" name="Slide Image Placeholder 1"/>
+          <p:cNvSpPr>
+            <a:spLocks noGrp="1" noRot="1" noChangeAspect="1"/>
+          </p:cNvSpPr>
+          <p:nvPr>
+            <p:ph type="sldImg"/>
+          </p:nvPr>
+        </p:nvSpPr>
+        <p:spPr/>
+      </p:sp>
+      <p:sp>
+        <p:nvSpPr>
+          <p:cNvPr id="3" name="Notes Placeholder 2"/>
+          <p:cNvSpPr>
+            <a:spLocks noGrp="1"/>
+          </p:cNvSpPr>
+          <p:nvPr>
+            <p:ph type="body" idx="1"/>
+          </p:nvPr>
+        </p:nvSpPr>
+        <p:spPr/>
+        <p:txBody>
+          <a:bodyPr/>
+          <a:lstStyle/>
+          <a:p>
+            <a:pPr marL="0" marR="0" lvl="0" indent="0" algn="r" defTabSz="914400" rtl="0" eaLnBrk="1" fontAlgn="auto" latinLnBrk="0" hangingPunct="1">
+              <a:lnSpc>
+                <a:spcPct val="100000"/>
+              </a:lnSpc>
+              <a:spcBef>
+                <a:spcPts val="0"/>
+              </a:spcBef>
+              <a:spcAft>
+                <a:spcPts val="0"/>
+              </a:spcAft>
+              <a:buClrTx/>
+              <a:buSzTx/>
+              <a:buFontTx/>
+              <a:buNone/>
+              <a:tabLst/>
+              <a:defRPr/>
+            </a:pPr>
+            <a:r>
+              <a:rPr lang="fa-IR" sz="1200" dirty="0">
+                <a:effectLst/>
+                <a:latin typeface="Calibri" panose="020F0502020204030204" pitchFamily="34" charset="0"/>
+                <a:ea typeface="Calibri" panose="020F0502020204030204" pitchFamily="34" charset="0"/>
+                <a:cs typeface="B Nazanin" panose="00000400000000000000" pitchFamily="2" charset="-78"/>
+              </a:rPr>
+              <a:t>در این روش که بر پایه ی ساخت پویای یک درخت می باشد، ابتدا یک کران عمومی با استفاده از یک روش ابتکاری ساخته می شود و سپس گره های زیر مساله ی بعدی با رهایی از یک محدودیت، تولید و حل میگردند. سپس مقدار بهینه ی گره در صورت شدنی بودن، با کران همگانی مقایسه و  مقدار کران، به روز رسانی می شود. در صورت نشدنی بودن مقدار بهینه، این مقدار با کران همگانی مقایسه و زیر درخت گره، هرس می گردد. این عمل تا زمان رسیدن به جواب بهینه، ادامه پیدا خواهد کرد.</a:t>
+            </a:r>
+            <a:endParaRPr lang="en-US" sz="1200" dirty="0">
+              <a:effectLst/>
+              <a:latin typeface="Calibri" panose="020F0502020204030204" pitchFamily="34" charset="0"/>
+              <a:ea typeface="Calibri" panose="020F0502020204030204" pitchFamily="34" charset="0"/>
+              <a:cs typeface="Arial" panose="020B0604020202020204" pitchFamily="34" charset="0"/>
+            </a:endParaRPr>
+          </a:p>
+          <a:p>
+            <a:endParaRPr lang="en-US" dirty="0"/>
+          </a:p>
+        </p:txBody>
+      </p:sp>
+      <p:sp>
+        <p:nvSpPr>
+          <p:cNvPr id="4" name="Slide Number Placeholder 3"/>
+          <p:cNvSpPr>
+            <a:spLocks noGrp="1"/>
+          </p:cNvSpPr>
+          <p:nvPr>
+            <p:ph type="sldNum" sz="quarter" idx="5"/>
+          </p:nvPr>
+        </p:nvSpPr>
+        <p:spPr/>
+        <p:txBody>
+          <a:bodyPr/>
+          <a:lstStyle/>
+          <a:p>
+            <a:fld id="{1AAC8123-9037-410D-87B1-CFC36B287576}" type="slidenum">
+              <a:rPr lang="en-US" smtClean="0"/>
+              <a:t>14</a:t>
+            </a:fld>
+            <a:endParaRPr lang="en-US"/>
+          </a:p>
+        </p:txBody>
+      </p:sp>
+    </p:spTree>
+    <p:extLst>
+      <p:ext uri="{BB962C8B-B14F-4D97-AF65-F5344CB8AC3E}">
+        <p14:creationId xmlns:p14="http://schemas.microsoft.com/office/powerpoint/2010/main" val="1899988434"/>
       </p:ext>
     </p:extLst>
   </p:cSld>
@@ -5858,8 +5978,8 @@
           </a:p>
         </p:txBody>
       </p:sp>
-      <mc:AlternateContent xmlns:mc="http://schemas.openxmlformats.org/markup-compatibility/2006">
-        <mc:Choice xmlns:a14="http://schemas.microsoft.com/office/drawing/2010/main" Requires="a14">
+      <mc:AlternateContent xmlns:mc="http://schemas.openxmlformats.org/markup-compatibility/2006" xmlns:a14="http://schemas.microsoft.com/office/drawing/2010/main">
+        <mc:Choice Requires="a14">
           <p:sp>
             <p:nvSpPr>
               <p:cNvPr id="3" name="Content Placeholder 2">
@@ -6619,7 +6739,7 @@
             </p:txBody>
           </p:sp>
         </mc:Choice>
-        <mc:Fallback>
+        <mc:Fallback xmlns="">
           <p:sp>
             <p:nvSpPr>
               <p:cNvPr id="3" name="Content Placeholder 2">
@@ -6859,6 +6979,130 @@
           <p:cNvPr id="2" name="Title 1">
             <a:extLst>
               <a:ext uri="{FF2B5EF4-FFF2-40B4-BE49-F238E27FC236}">
+                <a16:creationId xmlns:a16="http://schemas.microsoft.com/office/drawing/2014/main" id="{7225F6B3-6C4F-FBB9-74B1-4DD7711C7E67}"/>
+              </a:ext>
+            </a:extLst>
+          </p:cNvPr>
+          <p:cNvSpPr>
+            <a:spLocks noGrp="1"/>
+          </p:cNvSpPr>
+          <p:nvPr>
+            <p:ph type="title"/>
+          </p:nvPr>
+        </p:nvSpPr>
+        <p:spPr/>
+        <p:txBody>
+          <a:bodyPr/>
+          <a:lstStyle/>
+          <a:p>
+            <a:pPr algn="ctr" rtl="1"/>
+            <a:r>
+              <a:rPr lang="fa-IR" dirty="0">
+                <a:cs typeface="B Nazanin" panose="00000400000000000000" pitchFamily="2" charset="-78"/>
+              </a:rPr>
+              <a:t>۸. مدل پیشنهادی: برخی از پارامتر ها</a:t>
+            </a:r>
+            <a:endParaRPr lang="en-US" dirty="0">
+              <a:cs typeface="B Nazanin" panose="00000400000000000000" pitchFamily="2" charset="-78"/>
+            </a:endParaRPr>
+          </a:p>
+        </p:txBody>
+      </p:sp>
+      <p:pic>
+        <p:nvPicPr>
+          <p:cNvPr id="6" name="Content Placeholder 5">
+            <a:extLst>
+              <a:ext uri="{FF2B5EF4-FFF2-40B4-BE49-F238E27FC236}">
+                <a16:creationId xmlns:a16="http://schemas.microsoft.com/office/drawing/2014/main" id="{A7119BEE-71E4-C07F-B36B-A9A70B2AA1D9}"/>
+              </a:ext>
+            </a:extLst>
+          </p:cNvPr>
+          <p:cNvPicPr>
+            <a:picLocks noGrp="1" noChangeAspect="1"/>
+          </p:cNvPicPr>
+          <p:nvPr>
+            <p:ph idx="1"/>
+          </p:nvPr>
+        </p:nvPicPr>
+        <p:blipFill>
+          <a:blip r:embed="rId2">
+            <a:extLst>
+              <a:ext uri="{96DAC541-7B7A-43D3-8B79-37D633B846F1}">
+                <asvg:svgBlip xmlns:asvg="http://schemas.microsoft.com/office/drawing/2016/SVG/main" r:embed="rId3"/>
+              </a:ext>
+            </a:extLst>
+          </a:blip>
+          <a:stretch>
+            <a:fillRect/>
+          </a:stretch>
+        </p:blipFill>
+        <p:spPr>
+          <a:xfrm>
+            <a:off x="3932339" y="1554366"/>
+            <a:ext cx="7509153" cy="4404594"/>
+          </a:xfrm>
+        </p:spPr>
+      </p:pic>
+      <p:sp>
+        <p:nvSpPr>
+          <p:cNvPr id="4" name="Footer Placeholder 3">
+            <a:extLst>
+              <a:ext uri="{FF2B5EF4-FFF2-40B4-BE49-F238E27FC236}">
+                <a16:creationId xmlns:a16="http://schemas.microsoft.com/office/drawing/2014/main" id="{23980BC4-86A1-E8B2-46A7-67CAA37DC24C}"/>
+              </a:ext>
+            </a:extLst>
+          </p:cNvPr>
+          <p:cNvSpPr>
+            <a:spLocks noGrp="1"/>
+          </p:cNvSpPr>
+          <p:nvPr>
+            <p:ph type="ftr" sz="quarter" idx="11"/>
+          </p:nvPr>
+        </p:nvSpPr>
+        <p:spPr/>
+        <p:txBody>
+          <a:bodyPr/>
+          <a:lstStyle/>
+          <a:p>
+            <a:endParaRPr lang="en-US" dirty="0"/>
+          </a:p>
+        </p:txBody>
+      </p:sp>
+    </p:spTree>
+    <p:extLst>
+      <p:ext uri="{BB962C8B-B14F-4D97-AF65-F5344CB8AC3E}">
+        <p14:creationId xmlns:p14="http://schemas.microsoft.com/office/powerpoint/2010/main" val="185951014"/>
+      </p:ext>
+    </p:extLst>
+  </p:cSld>
+  <p:clrMapOvr>
+    <a:masterClrMapping/>
+  </p:clrMapOvr>
+</p:sld>
+</file>
+
+<file path=ppt/slides/slide14.xml><?xml version="1.0" encoding="utf-8"?>
+<p:sld xmlns:a="http://schemas.openxmlformats.org/drawingml/2006/main" xmlns:r="http://schemas.openxmlformats.org/officeDocument/2006/relationships" xmlns:p="http://schemas.openxmlformats.org/presentationml/2006/main">
+  <p:cSld>
+    <p:spTree>
+      <p:nvGrpSpPr>
+        <p:cNvPr id="1" name=""/>
+        <p:cNvGrpSpPr/>
+        <p:nvPr/>
+      </p:nvGrpSpPr>
+      <p:grpSpPr>
+        <a:xfrm>
+          <a:off x="0" y="0"/>
+          <a:ext cx="0" cy="0"/>
+          <a:chOff x="0" y="0"/>
+          <a:chExt cx="0" cy="0"/>
+        </a:xfrm>
+      </p:grpSpPr>
+      <p:sp>
+        <p:nvSpPr>
+          <p:cNvPr id="2" name="Title 1">
+            <a:extLst>
+              <a:ext uri="{FF2B5EF4-FFF2-40B4-BE49-F238E27FC236}">
                 <a16:creationId xmlns:a16="http://schemas.microsoft.com/office/drawing/2014/main" id="{4FC9C0B9-9BA1-5C5F-1B7A-843A85DD035E}"/>
               </a:ext>
             </a:extLst>
@@ -6904,7 +7148,12 @@
             <p:ph idx="1"/>
           </p:nvPr>
         </p:nvSpPr>
-        <p:spPr/>
+        <p:spPr>
+          <a:xfrm>
+            <a:off x="838199" y="1825625"/>
+            <a:ext cx="10785389" cy="4351338"/>
+          </a:xfrm>
+        </p:spPr>
         <p:txBody>
           <a:bodyPr>
             <a:normAutofit/>
@@ -6965,7 +7214,25 @@
                 <a:ea typeface="Calibri" panose="020F0502020204030204" pitchFamily="34" charset="0"/>
                 <a:cs typeface="B Nazanin" panose="00000400000000000000" pitchFamily="2" charset="-78"/>
               </a:rPr>
-              <a:t>) است. عناصر اصلی روش شاخه و کرانه عبارتند از</a:t>
+              <a:t>) است. عناصر اصلی روش شاخه و کرانه عبارتند از (تومازلا و همکاران ۲۰۲۰)[</a:t>
+            </a:r>
+            <a:r>
+              <a:rPr lang="fa-IR" sz="1800" dirty="0">
+                <a:effectLst/>
+                <a:latin typeface="Calibri" panose="020F0502020204030204" pitchFamily="34" charset="0"/>
+                <a:ea typeface="Calibri" panose="020F0502020204030204" pitchFamily="34" charset="0"/>
+                <a:cs typeface="Arial" panose="020B0604020202020204" pitchFamily="34" charset="0"/>
+              </a:rPr>
+              <a:t>۱</a:t>
+            </a:r>
+            <a:r>
+              <a:rPr lang="fa-IR" sz="1800" dirty="0">
+                <a:effectLst/>
+                <a:latin typeface="Calibri" panose="020F0502020204030204" pitchFamily="34" charset="0"/>
+                <a:ea typeface="Calibri" panose="020F0502020204030204" pitchFamily="34" charset="0"/>
+                <a:cs typeface="B Nazanin" panose="00000400000000000000" pitchFamily="2" charset="-78"/>
+              </a:rPr>
+              <a:t>]</a:t>
             </a:r>
           </a:p>
           <a:p>
@@ -7017,19 +7284,13 @@
               <a:t>. </a:t>
             </a:r>
             <a:r>
-              <a:rPr lang="fa-IR" sz="1800" b="1">
-                <a:effectLst/>
+              <a:rPr lang="fa-IR" sz="1800" b="1" dirty="0">
                 <a:latin typeface="Calibri" panose="020F0502020204030204" pitchFamily="34" charset="0"/>
                 <a:ea typeface="Calibri" panose="020F0502020204030204" pitchFamily="34" charset="0"/>
                 <a:cs typeface="B Nazanin" panose="00000400000000000000" pitchFamily="2" charset="-78"/>
               </a:rPr>
-              <a:t>هرچه </a:t>
-            </a:r>
-            <a:endParaRPr lang="fa-IR" sz="1800" b="1" dirty="0">
-              <a:latin typeface="Calibri" panose="020F0502020204030204" pitchFamily="34" charset="0"/>
-              <a:ea typeface="Calibri" panose="020F0502020204030204" pitchFamily="34" charset="0"/>
-              <a:cs typeface="B Nazanin" panose="00000400000000000000" pitchFamily="2" charset="-78"/>
-            </a:endParaRPr>
+              <a:t>با استفاده از این کران، به مقدار بهینه همگرا خواهد شد.</a:t>
+            </a:r>
           </a:p>
           <a:p>
             <a:pPr marL="0" marR="0" algn="just" rtl="1">
@@ -7050,8 +7311,55 @@
                 <a:ea typeface="Calibri" panose="020F0502020204030204" pitchFamily="34" charset="0"/>
                 <a:cs typeface="B Nazanin" panose="00000400000000000000" pitchFamily="2" charset="-78"/>
               </a:rPr>
-              <a:t>کران بالای عمومی درخت، </a:t>
-            </a:r>
+              <a:t>کران بالای عمومی درخت</a:t>
+            </a:r>
+            <a:r>
+              <a:rPr lang="fa-IR" sz="1800" dirty="0">
+                <a:latin typeface="Calibri" panose="020F0502020204030204" pitchFamily="34" charset="0"/>
+                <a:ea typeface="Calibri" panose="020F0502020204030204" pitchFamily="34" charset="0"/>
+                <a:cs typeface="B Nazanin" panose="00000400000000000000" pitchFamily="2" charset="-78"/>
+              </a:rPr>
+              <a:t>:</a:t>
+            </a:r>
+            <a:r>
+              <a:rPr lang="fa-IR" sz="1800" dirty="0">
+                <a:effectLst/>
+                <a:latin typeface="Calibri" panose="020F0502020204030204" pitchFamily="34" charset="0"/>
+                <a:ea typeface="Calibri" panose="020F0502020204030204" pitchFamily="34" charset="0"/>
+                <a:cs typeface="B Nazanin" panose="00000400000000000000" pitchFamily="2" charset="-78"/>
+              </a:rPr>
+              <a:t> </a:t>
+            </a:r>
+            <a:r>
+              <a:rPr lang="fa-IR" sz="1800" dirty="0">
+                <a:latin typeface="Calibri" panose="020F0502020204030204" pitchFamily="34" charset="0"/>
+                <a:ea typeface="Calibri" panose="020F0502020204030204" pitchFamily="34" charset="0"/>
+                <a:cs typeface="B Nazanin" panose="00000400000000000000" pitchFamily="2" charset="-78"/>
+              </a:rPr>
+              <a:t>با استفاده یک روش ابتکاری، ابتدا به دست می آید. سپس جهت هرس نمودن</a:t>
+            </a:r>
+            <a:r>
+              <a:rPr lang="fa-IR" sz="1800" baseline="30000" dirty="0">
+                <a:latin typeface="Calibri" panose="020F0502020204030204" pitchFamily="34" charset="0"/>
+                <a:ea typeface="Calibri" panose="020F0502020204030204" pitchFamily="34" charset="0"/>
+                <a:cs typeface="B Nazanin" panose="00000400000000000000" pitchFamily="2" charset="-78"/>
+              </a:rPr>
+              <a:t>۲ </a:t>
+            </a:r>
+            <a:r>
+              <a:rPr lang="fa-IR" sz="1800" dirty="0">
+                <a:latin typeface="Calibri" panose="020F0502020204030204" pitchFamily="34" charset="0"/>
+                <a:ea typeface="Calibri" panose="020F0502020204030204" pitchFamily="34" charset="0"/>
+                <a:cs typeface="B Nazanin" panose="00000400000000000000" pitchFamily="2" charset="-78"/>
+              </a:rPr>
+              <a:t>شاخه های بعد مورد استفاده قرار می گیرد.( در صورت نشدنی بودن مسأله)</a:t>
+            </a:r>
+            <a:endParaRPr lang="fa-IR" sz="1800" baseline="30000" dirty="0">
+              <a:effectLst/>
+              <a:latin typeface="Calibri" panose="020F0502020204030204" pitchFamily="34" charset="0"/>
+              <a:ea typeface="Calibri" panose="020F0502020204030204" pitchFamily="34" charset="0"/>
+              <a:cs typeface="B Nazanin" panose="00000400000000000000" pitchFamily="2" charset="-78"/>
+            </a:endParaRPr>
           </a:p>
           <a:p>
             <a:pPr marL="0" marR="0" algn="just" rtl="1">
@@ -7072,7 +7380,7 @@
                 <a:ea typeface="Calibri" panose="020F0502020204030204" pitchFamily="34" charset="0"/>
                 <a:cs typeface="B Nazanin" panose="00000400000000000000" pitchFamily="2" charset="-78"/>
               </a:rPr>
-              <a:t>روش انتخاب گره بعدی (جهت شاخه بندی)، </a:t>
+              <a:t>روش انتخاب گره بعدی (جهت شاخه بندی): جستجو برای بهترین کاندید گسترش درخت</a:t>
             </a:r>
           </a:p>
           <a:p>
@@ -7094,7 +7402,7 @@
                 <a:ea typeface="Calibri" panose="020F0502020204030204" pitchFamily="34" charset="0"/>
                 <a:cs typeface="B Nazanin" panose="00000400000000000000" pitchFamily="2" charset="-78"/>
               </a:rPr>
-              <a:t>استراتژی شاخه بندی، قواعد هرس کردن و اصل توقف از شاخه بندی.</a:t>
+              <a:t>استراتژی شاخه بندی</a:t>
             </a:r>
           </a:p>
           <a:p>
@@ -7116,32 +7424,30 @@
                 <a:ea typeface="Calibri" panose="020F0502020204030204" pitchFamily="34" charset="0"/>
                 <a:cs typeface="B Nazanin" panose="00000400000000000000" pitchFamily="2" charset="-78"/>
               </a:rPr>
-              <a:t> (تومازلا و همکاران ۲۰۲۰)[</a:t>
-            </a:r>
+              <a:t> قواعد هرس کردن  </a:t>
+            </a:r>
+          </a:p>
+          <a:p>
+            <a:pPr marL="0" marR="0" algn="just" rtl="1">
+              <a:lnSpc>
+                <a:spcPct val="107000"/>
+              </a:lnSpc>
+              <a:spcBef>
+                <a:spcPts val="0"/>
+              </a:spcBef>
+              <a:spcAft>
+                <a:spcPts val="800"/>
+              </a:spcAft>
+            </a:pPr>
             <a:r>
               <a:rPr lang="fa-IR" sz="1800" dirty="0">
                 <a:effectLst/>
                 <a:latin typeface="Calibri" panose="020F0502020204030204" pitchFamily="34" charset="0"/>
                 <a:ea typeface="Calibri" panose="020F0502020204030204" pitchFamily="34" charset="0"/>
-                <a:cs typeface="Arial" panose="020B0604020202020204" pitchFamily="34" charset="0"/>
-              </a:rPr>
-              <a:t>۱</a:t>
-            </a:r>
-            <a:r>
-              <a:rPr lang="fa-IR" sz="1800" dirty="0">
-                <a:effectLst/>
-                <a:latin typeface="Calibri" panose="020F0502020204030204" pitchFamily="34" charset="0"/>
-                <a:ea typeface="Calibri" panose="020F0502020204030204" pitchFamily="34" charset="0"/>
-                <a:cs typeface="B Nazanin" panose="00000400000000000000" pitchFamily="2" charset="-78"/>
-              </a:rPr>
-              <a:t>] در این روش که بر پایه ی ساخت پویای یک درخت می باشد، ابتدا یک کران عمومی با استفاده از یک روش ابتکاری ساخته می شود و سپس گره های زیر مساله ی بعدی با رهایی از یک محدودیت، تولید و حل میگردند. سپس مقدار بهینه ی گره در صورت شدنی بودن، با کران همگانی مقایسه و  مقدار کران، به روز رسانی می شود. در صورت نشدنی بودن مقدار بهینه، این مقدار با کران همگانی مقایسه و زیر درخت گره، هرس می گردد. این عمل تا زمان رسیدن به جواب بهینه، ادامه پیدا خواهد کرد.</a:t>
-            </a:r>
-            <a:endParaRPr lang="en-US" sz="1800" dirty="0">
-              <a:effectLst/>
-              <a:latin typeface="Calibri" panose="020F0502020204030204" pitchFamily="34" charset="0"/>
-              <a:ea typeface="Calibri" panose="020F0502020204030204" pitchFamily="34" charset="0"/>
-              <a:cs typeface="Arial" panose="020B0604020202020204" pitchFamily="34" charset="0"/>
-            </a:endParaRPr>
+                <a:cs typeface="B Nazanin" panose="00000400000000000000" pitchFamily="2" charset="-78"/>
+              </a:rPr>
+              <a:t>اصل توقف از شاخه بندی</a:t>
+            </a:r>
           </a:p>
           <a:p>
             <a:pPr marL="0" indent="0" algn="r" rtl="1">
@@ -7177,7 +7483,9 @@
           <a:bodyPr/>
           <a:lstStyle/>
           <a:p>
-            <a:pPr algn="r" rtl="1"/>
+            <a:pPr marL="228600" indent="-228600" algn="r" rtl="1">
+              <a:buAutoNum type="arabicPeriod"/>
+            </a:pPr>
             <a:r>
               <a:rPr lang="fa-IR" b="1" dirty="0">
                 <a:solidFill>
@@ -7185,7 +7493,7 @@
                 </a:solidFill>
                 <a:cs typeface="B Nazanin" panose="00000400000000000000" pitchFamily="2" charset="-78"/>
               </a:rPr>
-              <a:t>۱. رهایی (</a:t>
+              <a:t>رهایی (</a:t>
             </a:r>
             <a:r>
               <a:rPr lang="en-US" b="1" dirty="0">
@@ -7205,12 +7513,20 @@
               </a:rPr>
               <a:t>) به معنی برداشتن محدودیت دو دویی بودن متغیر ها و تبدیل مسأله به یک مساله ی ساده تر می باشد.</a:t>
             </a:r>
-            <a:endParaRPr lang="en-US" b="1" dirty="0">
-              <a:solidFill>
-                <a:schemeClr val="tx1"/>
-              </a:solidFill>
-              <a:cs typeface="B Nazanin" panose="00000400000000000000" pitchFamily="2" charset="-78"/>
-            </a:endParaRPr>
+          </a:p>
+          <a:p>
+            <a:pPr marL="228600" indent="-228600">
+              <a:buAutoNum type="arabicPeriod"/>
+            </a:pPr>
+            <a:r>
+              <a:rPr lang="en-US" b="1" dirty="0">
+                <a:solidFill>
+                  <a:schemeClr val="tx1"/>
+                </a:solidFill>
+                <a:cs typeface="B Nazanin" panose="00000400000000000000" pitchFamily="2" charset="-78"/>
+              </a:rPr>
+              <a:t>pruning</a:t>
+            </a:r>
           </a:p>
         </p:txBody>
       </p:sp>
@@ -7227,7 +7543,7 @@
 </p:sld>
 </file>
 
-<file path=ppt/slides/slide14.xml><?xml version="1.0" encoding="utf-8"?>
+<file path=ppt/slides/slide15.xml><?xml version="1.0" encoding="utf-8"?>
 <p:sld xmlns:a="http://schemas.openxmlformats.org/drawingml/2006/main" xmlns:r="http://schemas.openxmlformats.org/officeDocument/2006/relationships" xmlns:p="http://schemas.openxmlformats.org/presentationml/2006/main">
   <p:cSld>
     <p:spTree>
@@ -7432,7 +7748,7 @@
 </p:sld>
 </file>
 
-<file path=ppt/slides/slide15.xml><?xml version="1.0" encoding="utf-8"?>
+<file path=ppt/slides/slide16.xml><?xml version="1.0" encoding="utf-8"?>
 <p:sld xmlns:a="http://schemas.openxmlformats.org/drawingml/2006/main" xmlns:r="http://schemas.openxmlformats.org/officeDocument/2006/relationships" xmlns:p="http://schemas.openxmlformats.org/presentationml/2006/main">
   <p:cSld>
     <p:spTree>
@@ -7572,7 +7888,327 @@
 </p:sld>
 </file>
 
-<file path=ppt/slides/slide16.xml><?xml version="1.0" encoding="utf-8"?>
+<file path=ppt/slides/slide17.xml><?xml version="1.0" encoding="utf-8"?>
+<p:sld xmlns:a="http://schemas.openxmlformats.org/drawingml/2006/main" xmlns:r="http://schemas.openxmlformats.org/officeDocument/2006/relationships" xmlns:p="http://schemas.openxmlformats.org/presentationml/2006/main">
+  <p:cSld>
+    <p:spTree>
+      <p:nvGrpSpPr>
+        <p:cNvPr id="1" name=""/>
+        <p:cNvGrpSpPr/>
+        <p:nvPr/>
+      </p:nvGrpSpPr>
+      <p:grpSpPr>
+        <a:xfrm>
+          <a:off x="0" y="0"/>
+          <a:ext cx="0" cy="0"/>
+          <a:chOff x="0" y="0"/>
+          <a:chExt cx="0" cy="0"/>
+        </a:xfrm>
+      </p:grpSpPr>
+      <p:sp>
+        <p:nvSpPr>
+          <p:cNvPr id="2" name="Title 1">
+            <a:extLst>
+              <a:ext uri="{FF2B5EF4-FFF2-40B4-BE49-F238E27FC236}">
+                <a16:creationId xmlns:a16="http://schemas.microsoft.com/office/drawing/2014/main" id="{89D383BB-3CAA-47D3-6BE8-50960E997AD0}"/>
+              </a:ext>
+            </a:extLst>
+          </p:cNvPr>
+          <p:cNvSpPr>
+            <a:spLocks noGrp="1"/>
+          </p:cNvSpPr>
+          <p:nvPr>
+            <p:ph type="title"/>
+          </p:nvPr>
+        </p:nvSpPr>
+        <p:spPr>
+          <a:xfrm>
+            <a:off x="838200" y="41017"/>
+            <a:ext cx="10515600" cy="1325563"/>
+          </a:xfrm>
+        </p:spPr>
+        <p:txBody>
+          <a:bodyPr/>
+          <a:lstStyle/>
+          <a:p>
+            <a:pPr algn="ctr"/>
+            <a:r>
+              <a:rPr lang="fa-IR" dirty="0">
+                <a:cs typeface="B Nazanin" panose="00000400000000000000" pitchFamily="2" charset="-78"/>
+              </a:rPr>
+              <a:t>کارهای آتی</a:t>
+            </a:r>
+            <a:endParaRPr lang="en-US" dirty="0">
+              <a:cs typeface="B Nazanin" panose="00000400000000000000" pitchFamily="2" charset="-78"/>
+            </a:endParaRPr>
+          </a:p>
+        </p:txBody>
+      </p:sp>
+      <p:sp>
+        <p:nvSpPr>
+          <p:cNvPr id="3" name="Content Placeholder 2">
+            <a:extLst>
+              <a:ext uri="{FF2B5EF4-FFF2-40B4-BE49-F238E27FC236}">
+                <a16:creationId xmlns:a16="http://schemas.microsoft.com/office/drawing/2014/main" id="{761237F9-8C82-C2AC-27BC-1C3BFA1B7964}"/>
+              </a:ext>
+            </a:extLst>
+          </p:cNvPr>
+          <p:cNvSpPr>
+            <a:spLocks noGrp="1"/>
+          </p:cNvSpPr>
+          <p:nvPr>
+            <p:ph idx="1"/>
+          </p:nvPr>
+        </p:nvSpPr>
+        <p:spPr>
+          <a:xfrm>
+            <a:off x="5354593" y="1070018"/>
+            <a:ext cx="6336957" cy="1603375"/>
+          </a:xfrm>
+        </p:spPr>
+        <p:txBody>
+          <a:bodyPr>
+            <a:normAutofit fontScale="92500" lnSpcReduction="20000"/>
+          </a:bodyPr>
+          <a:lstStyle/>
+          <a:p>
+            <a:pPr algn="r" rtl="1"/>
+            <a:r>
+              <a:rPr lang="fa-IR" sz="2000" dirty="0">
+                <a:cs typeface="B Nazanin" panose="00000400000000000000" pitchFamily="2" charset="-78"/>
+              </a:rPr>
+              <a:t>اضافه نمودن این روش بدون تداخل در برنامه ی </a:t>
+            </a:r>
+            <a:r>
+              <a:rPr lang="en-US" sz="2000" dirty="0">
+                <a:cs typeface="B Nazanin" panose="00000400000000000000" pitchFamily="2" charset="-78"/>
+              </a:rPr>
+              <a:t>DSAGV</a:t>
+            </a:r>
+            <a:r>
+              <a:rPr lang="fa-IR" sz="2000" dirty="0">
+                <a:cs typeface="B Nazanin" panose="00000400000000000000" pitchFamily="2" charset="-78"/>
+              </a:rPr>
+              <a:t> </a:t>
+            </a:r>
+          </a:p>
+          <a:p>
+            <a:pPr algn="r" rtl="1"/>
+            <a:r>
+              <a:rPr lang="fa-IR" sz="2000" dirty="0">
+                <a:cs typeface="B Nazanin" panose="00000400000000000000" pitchFamily="2" charset="-78"/>
+              </a:rPr>
+              <a:t>انتشار نسخه ی بروز شده ی برنامه، بر پایه ی فریم ورک </a:t>
+            </a:r>
+            <a:r>
+              <a:rPr lang="en-US" sz="2000" dirty="0">
+                <a:cs typeface="B Nazanin" panose="00000400000000000000" pitchFamily="2" charset="-78"/>
+              </a:rPr>
+              <a:t>QT</a:t>
+            </a:r>
+            <a:endParaRPr lang="fa-IR" sz="2000" dirty="0">
+              <a:cs typeface="B Nazanin" panose="00000400000000000000" pitchFamily="2" charset="-78"/>
+            </a:endParaRPr>
+          </a:p>
+          <a:p>
+            <a:pPr algn="r" rtl="1"/>
+            <a:r>
+              <a:rPr lang="fa-IR" sz="2000" dirty="0">
+                <a:cs typeface="B Nazanin" panose="00000400000000000000" pitchFamily="2" charset="-78"/>
+              </a:rPr>
+              <a:t>اصلاح پایگاه داده های برنامه با استفاده از </a:t>
+            </a:r>
+            <a:r>
+              <a:rPr lang="en-US" sz="2000" dirty="0" err="1">
+                <a:cs typeface="B Nazanin" panose="00000400000000000000" pitchFamily="2" charset="-78"/>
+              </a:rPr>
+              <a:t>sqlite</a:t>
+            </a:r>
+            <a:r>
+              <a:rPr lang="fa-IR" sz="2000" dirty="0">
+                <a:cs typeface="B Nazanin" panose="00000400000000000000" pitchFamily="2" charset="-78"/>
+              </a:rPr>
+              <a:t> و ترسیم نمودار ها با استفاده از </a:t>
+            </a:r>
+            <a:r>
+              <a:rPr lang="en-US" sz="2000" dirty="0">
+                <a:cs typeface="B Nazanin" panose="00000400000000000000" pitchFamily="2" charset="-78"/>
+              </a:rPr>
+              <a:t>VTK</a:t>
+            </a:r>
+          </a:p>
+          <a:p>
+            <a:pPr algn="r" rtl="1"/>
+            <a:r>
+              <a:rPr lang="fa-IR" sz="2000" dirty="0">
+                <a:cs typeface="B Nazanin" panose="00000400000000000000" pitchFamily="2" charset="-78"/>
+              </a:rPr>
+              <a:t>ارائه ی برنامه به صورت مدل ارائه ی خدمت </a:t>
+            </a:r>
+            <a:r>
+              <a:rPr lang="en-US" sz="2000" dirty="0">
+                <a:cs typeface="B Nazanin" panose="00000400000000000000" pitchFamily="2" charset="-78"/>
+              </a:rPr>
+              <a:t>SaaS</a:t>
+            </a:r>
+          </a:p>
+        </p:txBody>
+      </p:sp>
+      <p:sp>
+        <p:nvSpPr>
+          <p:cNvPr id="4" name="Footer Placeholder 3">
+            <a:extLst>
+              <a:ext uri="{FF2B5EF4-FFF2-40B4-BE49-F238E27FC236}">
+                <a16:creationId xmlns:a16="http://schemas.microsoft.com/office/drawing/2014/main" id="{95833AE3-F35A-8621-1BDE-FD7312801B92}"/>
+              </a:ext>
+            </a:extLst>
+          </p:cNvPr>
+          <p:cNvSpPr>
+            <a:spLocks noGrp="1"/>
+          </p:cNvSpPr>
+          <p:nvPr>
+            <p:ph type="ftr" sz="quarter" idx="11"/>
+          </p:nvPr>
+        </p:nvSpPr>
+        <p:spPr/>
+        <p:txBody>
+          <a:bodyPr/>
+          <a:lstStyle/>
+          <a:p>
+            <a:endParaRPr lang="en-US" dirty="0"/>
+          </a:p>
+        </p:txBody>
+      </p:sp>
+      <p:pic>
+        <p:nvPicPr>
+          <p:cNvPr id="6" name="Picture 5">
+            <a:extLst>
+              <a:ext uri="{FF2B5EF4-FFF2-40B4-BE49-F238E27FC236}">
+                <a16:creationId xmlns:a16="http://schemas.microsoft.com/office/drawing/2014/main" id="{EC497CEF-FC1D-2CD5-BE2C-5367B01B2974}"/>
+              </a:ext>
+            </a:extLst>
+          </p:cNvPr>
+          <p:cNvPicPr>
+            <a:picLocks noChangeAspect="1"/>
+          </p:cNvPicPr>
+          <p:nvPr/>
+        </p:nvPicPr>
+        <p:blipFill>
+          <a:blip r:embed="rId2">
+            <a:extLst>
+              <a:ext uri="{28A0092B-C50C-407E-A947-70E740481C1C}">
+                <a14:useLocalDpi xmlns:a14="http://schemas.microsoft.com/office/drawing/2010/main" val="0"/>
+              </a:ext>
+            </a:extLst>
+          </a:blip>
+          <a:stretch>
+            <a:fillRect/>
+          </a:stretch>
+        </p:blipFill>
+        <p:spPr>
+          <a:xfrm>
+            <a:off x="102973" y="2482486"/>
+            <a:ext cx="5585254" cy="3830723"/>
+          </a:xfrm>
+          <a:prstGeom prst="rect">
+            <a:avLst/>
+          </a:prstGeom>
+        </p:spPr>
+      </p:pic>
+      <p:pic>
+        <p:nvPicPr>
+          <p:cNvPr id="8" name="Picture 7">
+            <a:extLst>
+              <a:ext uri="{FF2B5EF4-FFF2-40B4-BE49-F238E27FC236}">
+                <a16:creationId xmlns:a16="http://schemas.microsoft.com/office/drawing/2014/main" id="{29699491-6DC1-82FD-6022-F6DED751E919}"/>
+              </a:ext>
+            </a:extLst>
+          </p:cNvPr>
+          <p:cNvPicPr>
+            <a:picLocks noChangeAspect="1"/>
+          </p:cNvPicPr>
+          <p:nvPr/>
+        </p:nvPicPr>
+        <p:blipFill>
+          <a:blip r:embed="rId3">
+            <a:extLst>
+              <a:ext uri="{28A0092B-C50C-407E-A947-70E740481C1C}">
+                <a14:useLocalDpi xmlns:a14="http://schemas.microsoft.com/office/drawing/2010/main" val="0"/>
+              </a:ext>
+            </a:extLst>
+          </a:blip>
+          <a:stretch>
+            <a:fillRect/>
+          </a:stretch>
+        </p:blipFill>
+        <p:spPr>
+          <a:xfrm>
+            <a:off x="5923006" y="2482486"/>
+            <a:ext cx="5694728" cy="3829414"/>
+          </a:xfrm>
+          <a:prstGeom prst="rect">
+            <a:avLst/>
+          </a:prstGeom>
+        </p:spPr>
+      </p:pic>
+      <p:sp>
+        <p:nvSpPr>
+          <p:cNvPr id="9" name="TextBox 8">
+            <a:extLst>
+              <a:ext uri="{FF2B5EF4-FFF2-40B4-BE49-F238E27FC236}">
+                <a16:creationId xmlns:a16="http://schemas.microsoft.com/office/drawing/2014/main" id="{DFCA2489-1935-0373-E4C7-3B0020D47E14}"/>
+              </a:ext>
+            </a:extLst>
+          </p:cNvPr>
+          <p:cNvSpPr txBox="1"/>
+          <p:nvPr/>
+        </p:nvSpPr>
+        <p:spPr>
+          <a:xfrm>
+            <a:off x="4090087" y="6386040"/>
+            <a:ext cx="3665838" cy="523220"/>
+          </a:xfrm>
+          <a:prstGeom prst="rect">
+            <a:avLst/>
+          </a:prstGeom>
+          <a:noFill/>
+        </p:spPr>
+        <p:txBody>
+          <a:bodyPr wrap="square" rtlCol="0">
+            <a:spAutoFit/>
+          </a:bodyPr>
+          <a:lstStyle/>
+          <a:p>
+            <a:pPr algn="ctr" rtl="1"/>
+            <a:r>
+              <a:rPr lang="fa-IR" sz="1400" b="1" dirty="0">
+                <a:cs typeface="B Nazanin" panose="00000400000000000000" pitchFamily="2" charset="-78"/>
+              </a:rPr>
+              <a:t>شکل ۳. تصاویری از طراحی رابط کاربری با استفاده از </a:t>
+            </a:r>
+            <a:r>
+              <a:rPr lang="en-US" sz="1400" b="1" dirty="0">
+                <a:cs typeface="B Nazanin" panose="00000400000000000000" pitchFamily="2" charset="-78"/>
+              </a:rPr>
+              <a:t>Figma</a:t>
+            </a:r>
+          </a:p>
+        </p:txBody>
+      </p:sp>
+    </p:spTree>
+    <p:extLst>
+      <p:ext uri="{BB962C8B-B14F-4D97-AF65-F5344CB8AC3E}">
+        <p14:creationId xmlns:p14="http://schemas.microsoft.com/office/powerpoint/2010/main" val="353606580"/>
+      </p:ext>
+    </p:extLst>
+  </p:cSld>
+  <p:clrMapOvr>
+    <a:masterClrMapping/>
+  </p:clrMapOvr>
+</p:sld>
+</file>
+
+<file path=ppt/slides/slide18.xml><?xml version="1.0" encoding="utf-8"?>
 <p:sld xmlns:a="http://schemas.openxmlformats.org/drawingml/2006/main" xmlns:r="http://schemas.openxmlformats.org/officeDocument/2006/relationships" xmlns:p="http://schemas.openxmlformats.org/presentationml/2006/main">
   <p:cSld>
     <p:spTree>
@@ -11852,7 +12488,7 @@
           </p:nvSpPr>
           <p:spPr>
             <a:xfrm>
-              <a:off x="3027071" y="2741283"/>
+              <a:off x="2931899" y="2741283"/>
               <a:ext cx="1321456" cy="189235"/>
             </a:xfrm>
             <a:prstGeom prst="rect">
@@ -12704,7 +13340,7 @@
         </p:nvSpPr>
         <p:spPr>
           <a:xfrm>
-            <a:off x="2640550" y="3834882"/>
+            <a:off x="2502350" y="3809053"/>
             <a:ext cx="1928091" cy="400110"/>
           </a:xfrm>
           <a:prstGeom prst="rect">
@@ -13267,8 +13903,8 @@
         </p:nvSpPr>
         <p:spPr>
           <a:xfrm>
-            <a:off x="2301442" y="5242447"/>
-            <a:ext cx="2246738" cy="338554"/>
+            <a:off x="2321903" y="5250161"/>
+            <a:ext cx="2246738" cy="400110"/>
           </a:xfrm>
           <a:prstGeom prst="rect">
             <a:avLst/>
@@ -13511,15 +14147,15 @@
           <a:p>
             <a:pPr algn="ctr"/>
             <a:r>
-              <a:rPr lang="fa-IR" sz="1600" b="1" dirty="0">
+              <a:rPr lang="fa-IR" sz="2000" b="1" dirty="0">
                 <a:solidFill>
                   <a:schemeClr val="tx1"/>
                 </a:solidFill>
                 <a:cs typeface="B Nazanin" panose="00000400000000000000" pitchFamily="2" charset="-78"/>
               </a:rPr>
-              <a:t>پارامتر های مدل پیشنهادی</a:t>
-            </a:r>
-            <a:endParaRPr lang="en-US" sz="1600" b="1" dirty="0">
+              <a:t>کار های آتی</a:t>
+            </a:r>
+            <a:endParaRPr lang="en-US" sz="2000" b="1" dirty="0">
               <a:solidFill>
                 <a:schemeClr val="tx1"/>
               </a:solidFill>

</xml_diff>